<commit_message>
Winding design ansys model are updated and required parameters are found
WPT article, sketch of  introduction are written,
</commit_message>
<xml_diff>
--- a/Reports/IMMD/Impedance_model.pptx
+++ b/Reports/IMMD/Impedance_model.pptx
@@ -120,6 +120,11 @@
       </a:defRPr>
     </a:lvl9pPr>
   </p:defaultTextStyle>
+  <p:extLst>
+    <p:ext uri="{EFAFB233-063F-42B5-8137-9DF3F51BA10A}">
+      <p15:sldGuideLst xmlns:p15="http://schemas.microsoft.com/office/powerpoint/2012/main"/>
+    </p:ext>
+  </p:extLst>
 </p:presentation>
 </file>
 
@@ -3798,7 +3803,7 @@
         </p:blipFill>
         <p:spPr>
           <a:xfrm>
-            <a:off x="1474632" y="0"/>
+            <a:off x="854872" y="226062"/>
             <a:ext cx="9485290" cy="5169015"/>
           </a:xfrm>
           <a:prstGeom prst="rect">
@@ -3806,8 +3811,8 @@
           </a:prstGeom>
         </p:spPr>
       </p:pic>
-      <mc:AlternateContent xmlns:mc="http://schemas.openxmlformats.org/markup-compatibility/2006">
-        <mc:Choice xmlns:a14="http://schemas.microsoft.com/office/drawing/2010/main" Requires="a14">
+      <mc:AlternateContent xmlns:mc="http://schemas.openxmlformats.org/markup-compatibility/2006" xmlns:a14="http://schemas.microsoft.com/office/drawing/2010/main">
+        <mc:Choice Requires="a14">
           <p:sp>
             <p:nvSpPr>
               <p:cNvPr id="7" name="TextBox 6">
@@ -3922,13 +3927,7 @@
                           <a:rPr lang="tr-TR" b="0" i="1" smtClean="0">
                             <a:latin typeface="Cambria Math" panose="02040503050406030204" pitchFamily="18" charset="0"/>
                           </a:rPr>
-                          <m:t>𝑐𝑎𝑝</m:t>
-                        </m:r>
-                        <m:r>
-                          <a:rPr lang="tr-TR" b="0" i="1" smtClean="0">
-                            <a:latin typeface="Cambria Math" panose="02040503050406030204" pitchFamily="18" charset="0"/>
-                          </a:rPr>
-                          <m:t>𝐵</m:t>
+                          <m:t>𝑐𝑎𝑝𝐵</m:t>
                         </m:r>
                       </m:sub>
                     </m:sSub>
@@ -3965,13 +3964,7 @@
                           <a:rPr lang="tr-TR" b="0" i="1" smtClean="0">
                             <a:latin typeface="Cambria Math" panose="02040503050406030204" pitchFamily="18" charset="0"/>
                           </a:rPr>
-                          <m:t>𝑐𝑎𝑝</m:t>
-                        </m:r>
-                        <m:r>
-                          <a:rPr lang="tr-TR" b="0" i="1" smtClean="0">
-                            <a:latin typeface="Cambria Math" panose="02040503050406030204" pitchFamily="18" charset="0"/>
-                          </a:rPr>
-                          <m:t>𝐶</m:t>
+                          <m:t>𝑐𝑎𝑝𝐶</m:t>
                         </m:r>
                       </m:sub>
                     </m:sSub>
@@ -4549,7 +4542,7 @@
             </p:txBody>
           </p:sp>
         </mc:Choice>
-        <mc:Fallback>
+        <mc:Fallback xmlns="">
           <p:sp>
             <p:nvSpPr>
               <p:cNvPr id="7" name="TextBox 6">
@@ -5443,8 +5436,8 @@
           </a:p>
         </p:txBody>
       </p:sp>
-      <mc:AlternateContent xmlns:mc="http://schemas.openxmlformats.org/markup-compatibility/2006">
-        <mc:Choice xmlns:a14="http://schemas.microsoft.com/office/drawing/2010/main" Requires="a14">
+      <mc:AlternateContent xmlns:mc="http://schemas.openxmlformats.org/markup-compatibility/2006" xmlns:a14="http://schemas.microsoft.com/office/drawing/2010/main">
+        <mc:Choice Requires="a14">
           <p:graphicFrame>
             <p:nvGraphicFramePr>
               <p:cNvPr id="5" name="Table 4">
@@ -5761,6 +5754,7 @@
                         <a:bodyPr/>
                         <a:lstStyle/>
                         <a:p>
+                          <a:pPr/>
                           <a14:m>
                             <m:oMathPara xmlns:m="http://schemas.openxmlformats.org/officeDocument/2006/math">
                               <m:oMathParaPr>
@@ -5857,6 +5851,7 @@
                         <a:bodyPr/>
                         <a:lstStyle/>
                         <a:p>
+                          <a:pPr/>
                           <a14:m>
                             <m:oMathPara xmlns:m="http://schemas.openxmlformats.org/officeDocument/2006/math">
                               <m:oMathParaPr>
@@ -5884,13 +5879,7 @@
                                       <a:rPr lang="tr-TR" b="0" i="1" smtClean="0">
                                         <a:latin typeface="Cambria Math" panose="02040503050406030204" pitchFamily="18" charset="0"/>
                                       </a:rPr>
-                                      <m:t>𝐴</m:t>
-                                    </m:r>
-                                    <m:r>
-                                      <a:rPr lang="tr-TR" b="0" i="1" smtClean="0">
-                                        <a:latin typeface="Cambria Math" panose="02040503050406030204" pitchFamily="18" charset="0"/>
-                                      </a:rPr>
-                                      <m:t>𝐵</m:t>
+                                      <m:t>𝐴𝐵</m:t>
                                     </m:r>
                                   </m:sub>
                                 </m:sSub>
@@ -5962,6 +5951,7 @@
                         <a:bodyPr/>
                         <a:lstStyle/>
                         <a:p>
+                          <a:pPr/>
                           <a14:m>
                             <m:oMathPara xmlns:m="http://schemas.openxmlformats.org/officeDocument/2006/math">
                               <m:oMathParaPr>
@@ -5989,13 +5979,7 @@
                                       <a:rPr lang="tr-TR" b="0" i="1" smtClean="0">
                                         <a:latin typeface="Cambria Math" panose="02040503050406030204" pitchFamily="18" charset="0"/>
                                       </a:rPr>
-                                      <m:t>𝐴</m:t>
-                                    </m:r>
-                                    <m:r>
-                                      <a:rPr lang="tr-TR" b="0" i="1" smtClean="0">
-                                        <a:latin typeface="Cambria Math" panose="02040503050406030204" pitchFamily="18" charset="0"/>
-                                      </a:rPr>
-                                      <m:t>𝐶</m:t>
+                                      <m:t>𝐴𝐶</m:t>
                                     </m:r>
                                   </m:sub>
                                 </m:sSub>
@@ -6120,6 +6104,7 @@
                         <a:bodyPr/>
                         <a:lstStyle/>
                         <a:p>
+                          <a:pPr/>
                           <a14:m>
                             <m:oMathPara xmlns:m="http://schemas.openxmlformats.org/officeDocument/2006/math">
                               <m:oMathParaPr>
@@ -6147,13 +6132,7 @@
                                       <a:rPr lang="tr-TR" b="0" i="1" smtClean="0">
                                         <a:latin typeface="Cambria Math" panose="02040503050406030204" pitchFamily="18" charset="0"/>
                                       </a:rPr>
-                                      <m:t>𝐵</m:t>
-                                    </m:r>
-                                    <m:r>
-                                      <a:rPr lang="tr-TR" b="0" i="1" smtClean="0">
-                                        <a:latin typeface="Cambria Math" panose="02040503050406030204" pitchFamily="18" charset="0"/>
-                                      </a:rPr>
-                                      <m:t>𝐴</m:t>
+                                      <m:t>𝐵𝐴</m:t>
                                     </m:r>
                                   </m:sub>
                                 </m:sSub>
@@ -6222,6 +6201,7 @@
                         <a:bodyPr/>
                         <a:lstStyle/>
                         <a:p>
+                          <a:pPr/>
                           <a14:m>
                             <m:oMathPara xmlns:m="http://schemas.openxmlformats.org/officeDocument/2006/math">
                               <m:oMathParaPr>
@@ -6321,6 +6301,7 @@
                         <a:bodyPr/>
                         <a:lstStyle/>
                         <a:p>
+                          <a:pPr/>
                           <a14:m>
                             <m:oMathPara xmlns:m="http://schemas.openxmlformats.org/officeDocument/2006/math">
                               <m:oMathParaPr>
@@ -6470,6 +6451,7 @@
                         <a:bodyPr/>
                         <a:lstStyle/>
                         <a:p>
+                          <a:pPr/>
                           <a14:m>
                             <m:oMathPara xmlns:m="http://schemas.openxmlformats.org/officeDocument/2006/math">
                               <m:oMathParaPr>
@@ -6497,13 +6479,7 @@
                                       <a:rPr lang="tr-TR" b="0" i="1" smtClean="0">
                                         <a:latin typeface="Cambria Math" panose="02040503050406030204" pitchFamily="18" charset="0"/>
                                       </a:rPr>
-                                      <m:t>𝐶</m:t>
-                                    </m:r>
-                                    <m:r>
-                                      <a:rPr lang="tr-TR" b="0" i="1" smtClean="0">
-                                        <a:latin typeface="Cambria Math" panose="02040503050406030204" pitchFamily="18" charset="0"/>
-                                      </a:rPr>
-                                      <m:t>𝐴</m:t>
+                                      <m:t>𝐶𝐴</m:t>
                                     </m:r>
                                   </m:sub>
                                 </m:sSub>
@@ -6572,6 +6548,7 @@
                         <a:bodyPr/>
                         <a:lstStyle/>
                         <a:p>
+                          <a:pPr/>
                           <a14:m>
                             <m:oMathPara xmlns:m="http://schemas.openxmlformats.org/officeDocument/2006/math">
                               <m:oMathParaPr>
@@ -6668,6 +6645,7 @@
                         <a:bodyPr/>
                         <a:lstStyle/>
                         <a:p>
+                          <a:pPr/>
                           <a14:m>
                             <m:oMathPara xmlns:m="http://schemas.openxmlformats.org/officeDocument/2006/math">
                               <m:oMathParaPr>
@@ -6770,7 +6748,7 @@
             </a:graphic>
           </p:graphicFrame>
         </mc:Choice>
-        <mc:Fallback>
+        <mc:Fallback xmlns="">
           <p:graphicFrame>
             <p:nvGraphicFramePr>
               <p:cNvPr id="5" name="Table 4">
@@ -7659,8 +7637,8 @@
           </p:graphicFrame>
         </mc:Fallback>
       </mc:AlternateContent>
-      <mc:AlternateContent xmlns:mc="http://schemas.openxmlformats.org/markup-compatibility/2006">
-        <mc:Choice xmlns:a14="http://schemas.microsoft.com/office/drawing/2010/main" Requires="a14">
+      <mc:AlternateContent xmlns:mc="http://schemas.openxmlformats.org/markup-compatibility/2006" xmlns:a14="http://schemas.microsoft.com/office/drawing/2010/main">
+        <mc:Choice Requires="a14">
           <p:sp>
             <p:nvSpPr>
               <p:cNvPr id="7" name="Rectangle 6">
@@ -7991,13 +7969,7 @@
                           <a:rPr lang="tr-TR" b="0" i="1" smtClean="0">
                             <a:latin typeface="Cambria Math" panose="02040503050406030204" pitchFamily="18" charset="0"/>
                           </a:rPr>
-                          <m:t>𝐴</m:t>
-                        </m:r>
-                        <m:r>
-                          <a:rPr lang="tr-TR" b="0" i="1" smtClean="0">
-                            <a:latin typeface="Cambria Math" panose="02040503050406030204" pitchFamily="18" charset="0"/>
-                          </a:rPr>
-                          <m:t>𝐶</m:t>
+                          <m:t>𝐴𝐶</m:t>
                         </m:r>
                       </m:sub>
                     </m:sSub>
@@ -8026,7 +7998,7 @@
             </p:txBody>
           </p:sp>
         </mc:Choice>
-        <mc:Fallback>
+        <mc:Fallback xmlns="">
           <p:sp>
             <p:nvSpPr>
               <p:cNvPr id="7" name="Rectangle 6">
@@ -8688,8 +8660,8 @@
           </a:p>
         </p:txBody>
       </p:sp>
-      <mc:AlternateContent xmlns:mc="http://schemas.openxmlformats.org/markup-compatibility/2006">
-        <mc:Choice xmlns:a14="http://schemas.microsoft.com/office/drawing/2010/main" Requires="a14">
+      <mc:AlternateContent xmlns:mc="http://schemas.openxmlformats.org/markup-compatibility/2006" xmlns:a14="http://schemas.microsoft.com/office/drawing/2010/main">
+        <mc:Choice Requires="a14">
           <p:sp>
             <p:nvSpPr>
               <p:cNvPr id="7" name="Rectangle 6">
@@ -8717,6 +8689,7 @@
               </a:bodyPr>
               <a:lstStyle/>
               <a:p>
+                <a:pPr/>
                 <a14:m>
                   <m:oMathPara xmlns:m="http://schemas.openxmlformats.org/officeDocument/2006/math">
                     <m:oMathParaPr>
@@ -8760,6 +8733,7 @@
                 <a:endParaRPr lang="tr-TR" dirty="0"/>
               </a:p>
               <a:p>
+                <a:pPr/>
                 <a14:m>
                   <m:oMathPara xmlns:m="http://schemas.openxmlformats.org/officeDocument/2006/math">
                     <m:oMathParaPr>
@@ -8795,13 +8769,7 @@
                         <a:rPr lang="tr-TR" b="0" i="1" smtClean="0">
                           <a:latin typeface="Cambria Math" panose="02040503050406030204" pitchFamily="18" charset="0"/>
                         </a:rPr>
-                        <m:t>=</m:t>
-                      </m:r>
-                      <m:r>
-                        <a:rPr lang="tr-TR" b="0" i="1" smtClean="0">
-                          <a:latin typeface="Cambria Math" panose="02040503050406030204" pitchFamily="18" charset="0"/>
-                        </a:rPr>
-                        <m:t>270</m:t>
+                        <m:t>=270</m:t>
                       </m:r>
                     </m:oMath>
                   </m:oMathPara>
@@ -8844,13 +8812,7 @@
                       <a:rPr lang="tr-TR" b="0" i="1" smtClean="0">
                         <a:latin typeface="Cambria Math" panose="02040503050406030204" pitchFamily="18" charset="0"/>
                       </a:rPr>
-                      <m:t>=</m:t>
-                    </m:r>
-                    <m:r>
-                      <a:rPr lang="tr-TR" b="0" i="1" smtClean="0">
-                        <a:latin typeface="Cambria Math" panose="02040503050406030204" pitchFamily="18" charset="0"/>
-                      </a:rPr>
-                      <m:t>1988 </m:t>
+                      <m:t>=1988 </m:t>
                     </m:r>
                     <m:r>
                       <a:rPr lang="tr-TR" b="0" i="1" smtClean="0">
@@ -8865,7 +8827,7 @@
             </p:txBody>
           </p:sp>
         </mc:Choice>
-        <mc:Fallback>
+        <mc:Fallback xmlns="">
           <p:sp>
             <p:nvSpPr>
               <p:cNvPr id="7" name="Rectangle 6">
@@ -9000,8 +8962,8 @@
           </a:prstGeom>
         </p:spPr>
       </p:pic>
-      <mc:AlternateContent xmlns:mc="http://schemas.openxmlformats.org/markup-compatibility/2006">
-        <mc:Choice xmlns:a14="http://schemas.microsoft.com/office/drawing/2010/main" Requires="a14">
+      <mc:AlternateContent xmlns:mc="http://schemas.openxmlformats.org/markup-compatibility/2006" xmlns:a14="http://schemas.microsoft.com/office/drawing/2010/main">
+        <mc:Choice Requires="a14">
           <p:sp>
             <p:nvSpPr>
               <p:cNvPr id="5" name="TextBox 4">
@@ -9061,13 +9023,7 @@
                       <a:rPr lang="tr-TR" b="0" i="1" smtClean="0">
                         <a:latin typeface="Cambria Math" panose="02040503050406030204" pitchFamily="18" charset="0"/>
                       </a:rPr>
-                      <m:t>=</m:t>
-                    </m:r>
-                    <m:r>
-                      <a:rPr lang="tr-TR" b="0" i="1" smtClean="0">
-                        <a:latin typeface="Cambria Math" panose="02040503050406030204" pitchFamily="18" charset="0"/>
-                      </a:rPr>
-                      <m:t>7.9193</m:t>
+                      <m:t>=7.9193</m:t>
                     </m:r>
                   </m:oMath>
                 </a14:m>
@@ -9084,7 +9040,7 @@
             </p:txBody>
           </p:sp>
         </mc:Choice>
-        <mc:Fallback>
+        <mc:Fallback xmlns="">
           <p:sp>
             <p:nvSpPr>
               <p:cNvPr id="5" name="TextBox 4">
@@ -9181,7 +9137,7 @@
         </p:blipFill>
         <p:spPr>
           <a:xfrm>
-            <a:off x="466530" y="335901"/>
+            <a:off x="456370" y="290073"/>
             <a:ext cx="10903736" cy="5851133"/>
           </a:xfrm>
           <a:prstGeom prst="rect">

</xml_diff>